<commit_message>
change the order of the steps
</commit_message>
<xml_diff>
--- a/bootcamp-azure-fundamentels-v2.pptx
+++ b/bootcamp-azure-fundamentels-v2.pptx
@@ -5,10 +5,10 @@
     <p:sldMasterId id="2147483727" r:id="rId4"/>
   </p:sldMasterIdLst>
   <p:notesMasterIdLst>
-    <p:notesMasterId r:id="rId19"/>
+    <p:notesMasterId r:id="rId20"/>
   </p:notesMasterIdLst>
   <p:handoutMasterIdLst>
-    <p:handoutMasterId r:id="rId20"/>
+    <p:handoutMasterId r:id="rId21"/>
   </p:handoutMasterIdLst>
   <p:sldIdLst>
     <p:sldId id="684" r:id="rId5"/>
@@ -24,7 +24,8 @@
     <p:sldId id="1889" r:id="rId15"/>
     <p:sldId id="1890" r:id="rId16"/>
     <p:sldId id="1891" r:id="rId17"/>
-    <p:sldId id="342" r:id="rId18"/>
+    <p:sldId id="1892" r:id="rId18"/>
+    <p:sldId id="342" r:id="rId19"/>
   </p:sldIdLst>
   <p:sldSz cx="12436475" cy="6994525"/>
   <p:notesSz cx="7010400" cy="9296400"/>
@@ -141,6 +142,7 @@
             <p14:sldId id="1889"/>
             <p14:sldId id="1890"/>
             <p14:sldId id="1891"/>
+            <p14:sldId id="1892"/>
             <p14:sldId id="342"/>
           </p14:sldIdLst>
         </p14:section>
@@ -258,7 +260,7 @@
           <a:p>
             <a:fld id="{48782496-95A0-4193-B09F-6AD27878C74F}" type="datetimeFigureOut">
               <a:rPr lang="en-US" smtClean="0"/>
-              <a:t>5/9/2019</a:t>
+              <a:t>5/15/2019</a:t>
             </a:fld>
             <a:endParaRPr lang="en-US"/>
           </a:p>
@@ -435,7 +437,7 @@
           <a:p>
             <a:fld id="{41A012BF-EEA3-45CC-947C-015BB12AB8BD}" type="datetimeFigureOut">
               <a:rPr lang="en-US" smtClean="0"/>
-              <a:t>5/9/2019</a:t>
+              <a:t>5/15/2019</a:t>
             </a:fld>
             <a:endParaRPr lang="en-US"/>
           </a:p>
@@ -908,7 +910,7 @@
           <a:p>
             <a:fld id="{9427A7F7-BB1E-479D-AFAA-B52F4D0C99F2}" type="datetime8">
               <a:rPr lang="en-US" smtClean="0"/>
-              <a:t>5/9/2019 5:54 PM</a:t>
+              <a:t>5/15/2019 8:15 AM</a:t>
             </a:fld>
             <a:endParaRPr lang="en-US" dirty="0"/>
           </a:p>
@@ -1094,7 +1096,7 @@
               <a:pPr defTabSz="950464">
                 <a:defRPr/>
               </a:pPr>
-              <a:t>5/9/2019 5:54 PM</a:t>
+              <a:t>5/15/2019 8:15 AM</a:t>
             </a:fld>
             <a:endParaRPr lang="en-US">
               <a:solidFill>
@@ -1133,7 +1135,7 @@
               <a:pPr defTabSz="950464">
                 <a:defRPr/>
               </a:pPr>
-              <a:t>14</a:t>
+              <a:t>15</a:t>
             </a:fld>
             <a:endParaRPr lang="en-US">
               <a:solidFill>
@@ -6410,6 +6412,69 @@
           </a:p>
         </p:txBody>
       </p:sp>
+      <p:sp>
+        <p:nvSpPr>
+          <p:cNvPr id="5" name="Textfeld 4">
+            <a:extLst>
+              <a:ext uri="{FF2B5EF4-FFF2-40B4-BE49-F238E27FC236}">
+                <a16:creationId xmlns:a16="http://schemas.microsoft.com/office/drawing/2014/main" id="{722A0E9C-740B-4CB0-9612-D6B9D5127026}"/>
+              </a:ext>
+            </a:extLst>
+          </p:cNvPr>
+          <p:cNvSpPr txBox="1"/>
+          <p:nvPr/>
+        </p:nvSpPr>
+        <p:spPr>
+          <a:xfrm>
+            <a:off x="274700" y="6211503"/>
+            <a:ext cx="6795835" cy="627864"/>
+          </a:xfrm>
+          <a:prstGeom prst="rect">
+            <a:avLst/>
+          </a:prstGeom>
+          <a:noFill/>
+        </p:spPr>
+        <p:txBody>
+          <a:bodyPr wrap="none" lIns="182880" tIns="146304" rIns="182880" bIns="146304" rtlCol="0">
+            <a:spAutoFit/>
+          </a:bodyPr>
+          <a:lstStyle/>
+          <a:p>
+            <a:pPr>
+              <a:lnSpc>
+                <a:spcPct val="90000"/>
+              </a:lnSpc>
+              <a:spcAft>
+                <a:spcPts val="600"/>
+              </a:spcAft>
+            </a:pPr>
+            <a:r>
+              <a:rPr lang="de-DE" sz="2400" b="1" dirty="0">
+                <a:solidFill>
+                  <a:schemeClr val="bg1"/>
+                </a:solidFill>
+              </a:rPr>
+              <a:t>WLAN: </a:t>
+            </a:r>
+            <a:r>
+              <a:rPr lang="de-DE" sz="2400" b="1" dirty="0" err="1">
+                <a:solidFill>
+                  <a:schemeClr val="bg1"/>
+                </a:solidFill>
+              </a:rPr>
+              <a:t>MSFTGuest</a:t>
+            </a:r>
+            <a:r>
+              <a:rPr lang="de-DE" sz="2400" b="1" dirty="0">
+                <a:solidFill>
+                  <a:schemeClr val="bg1"/>
+                </a:solidFill>
+              </a:rPr>
+              <a:t>	Eventcode: msevent649wp </a:t>
+            </a:r>
+          </a:p>
+        </p:txBody>
+      </p:sp>
     </p:spTree>
     <p:extLst>
       <p:ext uri="{BB962C8B-B14F-4D97-AF65-F5344CB8AC3E}">
@@ -14034,6 +14099,161 @@
 <file path=ppt/slides/slide14.xml><?xml version="1.0" encoding="utf-8"?>
 <p:sld xmlns:a="http://schemas.openxmlformats.org/drawingml/2006/main" xmlns:r="http://schemas.openxmlformats.org/officeDocument/2006/relationships" xmlns:p="http://schemas.openxmlformats.org/presentationml/2006/main">
   <p:cSld>
+    <p:spTree>
+      <p:nvGrpSpPr>
+        <p:cNvPr id="1" name=""/>
+        <p:cNvGrpSpPr/>
+        <p:nvPr/>
+      </p:nvGrpSpPr>
+      <p:grpSpPr>
+        <a:xfrm>
+          <a:off x="0" y="0"/>
+          <a:ext cx="0" cy="0"/>
+          <a:chOff x="0" y="0"/>
+          <a:chExt cx="0" cy="0"/>
+        </a:xfrm>
+      </p:grpSpPr>
+      <p:sp>
+        <p:nvSpPr>
+          <p:cNvPr id="2" name="Titel 1">
+            <a:extLst>
+              <a:ext uri="{FF2B5EF4-FFF2-40B4-BE49-F238E27FC236}">
+                <a16:creationId xmlns:a16="http://schemas.microsoft.com/office/drawing/2014/main" id="{BD78144D-B4DC-4997-B22E-B5E65355D649}"/>
+              </a:ext>
+            </a:extLst>
+          </p:cNvPr>
+          <p:cNvSpPr>
+            <a:spLocks noGrp="1"/>
+          </p:cNvSpPr>
+          <p:nvPr>
+            <p:ph type="title"/>
+          </p:nvPr>
+        </p:nvSpPr>
+        <p:spPr/>
+        <p:txBody>
+          <a:bodyPr/>
+          <a:lstStyle/>
+          <a:p>
+            <a:r>
+              <a:rPr lang="de-DE" dirty="0"/>
+              <a:t>Feedback</a:t>
+            </a:r>
+          </a:p>
+        </p:txBody>
+      </p:sp>
+      <p:pic>
+        <p:nvPicPr>
+          <p:cNvPr id="3" name="Grafik 2">
+            <a:extLst>
+              <a:ext uri="{FF2B5EF4-FFF2-40B4-BE49-F238E27FC236}">
+                <a16:creationId xmlns:a16="http://schemas.microsoft.com/office/drawing/2014/main" id="{2AF96E29-26C2-47B3-91B4-E566DC983C88}"/>
+              </a:ext>
+            </a:extLst>
+          </p:cNvPr>
+          <p:cNvPicPr>
+            <a:picLocks noChangeAspect="1"/>
+          </p:cNvPicPr>
+          <p:nvPr/>
+        </p:nvPicPr>
+        <p:blipFill>
+          <a:blip r:embed="rId2"/>
+          <a:stretch>
+            <a:fillRect/>
+          </a:stretch>
+        </p:blipFill>
+        <p:spPr>
+          <a:xfrm>
+            <a:off x="3787364" y="1632333"/>
+            <a:ext cx="4861746" cy="4861746"/>
+          </a:xfrm>
+          <a:prstGeom prst="rect">
+            <a:avLst/>
+          </a:prstGeom>
+        </p:spPr>
+      </p:pic>
+      <p:sp>
+        <p:nvSpPr>
+          <p:cNvPr id="4" name="Textfeld 3">
+            <a:extLst>
+              <a:ext uri="{FF2B5EF4-FFF2-40B4-BE49-F238E27FC236}">
+                <a16:creationId xmlns:a16="http://schemas.microsoft.com/office/drawing/2014/main" id="{D910D983-5600-4F5A-B068-D272E796AF2D}"/>
+              </a:ext>
+            </a:extLst>
+          </p:cNvPr>
+          <p:cNvSpPr txBox="1"/>
+          <p:nvPr/>
+        </p:nvSpPr>
+        <p:spPr>
+          <a:xfrm>
+            <a:off x="274639" y="6416565"/>
+            <a:ext cx="4077848" cy="627864"/>
+          </a:xfrm>
+          <a:prstGeom prst="rect">
+            <a:avLst/>
+          </a:prstGeom>
+          <a:noFill/>
+        </p:spPr>
+        <p:txBody>
+          <a:bodyPr wrap="none" lIns="182880" tIns="146304" rIns="182880" bIns="146304" rtlCol="0">
+            <a:spAutoFit/>
+          </a:bodyPr>
+          <a:lstStyle/>
+          <a:p>
+            <a:pPr>
+              <a:lnSpc>
+                <a:spcPct val="90000"/>
+              </a:lnSpc>
+              <a:spcAft>
+                <a:spcPts val="600"/>
+              </a:spcAft>
+            </a:pPr>
+            <a:r>
+              <a:rPr lang="de-DE" sz="2400" dirty="0">
+                <a:gradFill>
+                  <a:gsLst>
+                    <a:gs pos="2917">
+                      <a:schemeClr val="tx1"/>
+                    </a:gs>
+                    <a:gs pos="30000">
+                      <a:schemeClr val="tx1"/>
+                    </a:gs>
+                  </a:gsLst>
+                  <a:lin ang="5400000" scaled="0"/>
+                </a:gradFill>
+              </a:rPr>
+              <a:t>Niels.ophey@microsoft.com</a:t>
+            </a:r>
+          </a:p>
+        </p:txBody>
+      </p:sp>
+    </p:spTree>
+    <p:extLst>
+      <p:ext uri="{BB962C8B-B14F-4D97-AF65-F5344CB8AC3E}">
+        <p14:creationId xmlns:p14="http://schemas.microsoft.com/office/powerpoint/2010/main" val="2957638129"/>
+      </p:ext>
+    </p:extLst>
+  </p:cSld>
+  <p:clrMapOvr>
+    <a:masterClrMapping/>
+  </p:clrMapOvr>
+  <mc:AlternateContent xmlns:mc="http://schemas.openxmlformats.org/markup-compatibility/2006" xmlns:p14="http://schemas.microsoft.com/office/powerpoint/2010/main">
+    <mc:Choice Requires="p14">
+      <p:transition spd="med" p14:dur="700">
+        <p:fade/>
+      </p:transition>
+    </mc:Choice>
+    <mc:Fallback xmlns="">
+      <p:transition spd="med">
+        <p:fade/>
+      </p:transition>
+    </mc:Fallback>
+  </mc:AlternateContent>
+</p:sld>
+</file>
+
+<file path=ppt/slides/slide15.xml><?xml version="1.0" encoding="utf-8"?>
+<p:sld xmlns:a="http://schemas.openxmlformats.org/drawingml/2006/main" xmlns:r="http://schemas.openxmlformats.org/officeDocument/2006/relationships" xmlns:p="http://schemas.openxmlformats.org/presentationml/2006/main">
+  <p:cSld>
     <p:bg>
       <p:bgPr>
         <a:solidFill>
@@ -14180,7 +14400,7 @@
             </a:pPr>
             <a:r>
               <a:rPr lang="de-DE" dirty="0"/>
-              <a:t>09:00 – 10:30 Uhr</a:t>
+              <a:t>09:00 – 10:45 Uhr</a:t>
             </a:r>
             <a:endParaRPr lang="de-DE" sz="2000" dirty="0">
               <a:gradFill>
@@ -14323,7 +14543,7 @@
             </a:pPr>
             <a:r>
               <a:rPr lang="de-DE" dirty="0"/>
-              <a:t>10:45 – 12:15 Uhr</a:t>
+              <a:t>10:45 – 13:00 Uhr</a:t>
             </a:r>
             <a:endParaRPr lang="de-DE" sz="2000" dirty="0">
               <a:gradFill>
@@ -14470,7 +14690,7 @@
             </a:pPr>
             <a:r>
               <a:rPr lang="de-DE" dirty="0"/>
-              <a:t>12:15 – 13:15 Uhr</a:t>
+              <a:t>13:00– 14:00 Uhr</a:t>
             </a:r>
             <a:endParaRPr lang="de-DE" sz="2000" dirty="0">
               <a:gradFill>
@@ -14615,7 +14835,7 @@
             </a:pPr>
             <a:r>
               <a:rPr lang="de-DE" dirty="0"/>
-              <a:t>13:15 – 14:45 Uhr</a:t>
+              <a:t>14:00 – 15:00 Uhr</a:t>
             </a:r>
             <a:endParaRPr lang="de-DE" sz="2000" dirty="0">
               <a:gradFill>
@@ -14762,7 +14982,7 @@
             </a:pPr>
             <a:r>
               <a:rPr lang="de-DE" dirty="0"/>
-              <a:t>14:45 – 15:00 Uhr</a:t>
+              <a:t>15:00 – 15:15 Uhr</a:t>
             </a:r>
             <a:endParaRPr lang="de-DE" sz="2000" dirty="0">
               <a:gradFill>
@@ -14911,7 +15131,7 @@
             </a:pPr>
             <a:r>
               <a:rPr lang="de-DE" dirty="0"/>
-              <a:t>15:00 – 16:30 Uhr</a:t>
+              <a:t>15:15 – 16:30 Uhr</a:t>
             </a:r>
             <a:endParaRPr lang="de-DE" sz="2000" dirty="0">
               <a:gradFill>
@@ -15058,7 +15278,7 @@
             </a:pPr>
             <a:r>
               <a:rPr lang="de-DE" dirty="0"/>
-              <a:t>10:30 – 10:45 Uhr</a:t>
+              <a:t>10:45 – 11:00 Uhr</a:t>
             </a:r>
             <a:endParaRPr lang="de-DE" sz="2000" dirty="0">
               <a:gradFill>
@@ -23812,9 +24032,12 @@
 </file>
 
 <file path=customXml/item1.xml><?xml version="1.0" encoding="utf-8"?>
-<p:properties xmlns:p="http://schemas.microsoft.com/office/2006/metadata/properties" xmlns:xsi="http://www.w3.org/2001/XMLSchema-instance" xmlns:pc="http://schemas.microsoft.com/office/infopath/2007/PartnerControls">
-  <documentManagement/>
-</p:properties>
+<?mso-contentType ?>
+<FormTemplates xmlns="http://schemas.microsoft.com/sharepoint/v3/contenttype/forms">
+  <Display>DocumentLibraryForm</Display>
+  <Edit>DocumentLibraryForm</Edit>
+  <New>DocumentLibraryForm</New>
+</FormTemplates>
 </file>
 
 <file path=customXml/item2.xml><?xml version="1.0" encoding="utf-8"?>
@@ -23932,25 +24155,15 @@
 </file>
 
 <file path=customXml/item3.xml><?xml version="1.0" encoding="utf-8"?>
-<?mso-contentType ?>
-<FormTemplates xmlns="http://schemas.microsoft.com/sharepoint/v3/contenttype/forms">
-  <Display>DocumentLibraryForm</Display>
-  <Edit>DocumentLibraryForm</Edit>
-  <New>DocumentLibraryForm</New>
-</FormTemplates>
+<p:properties xmlns:p="http://schemas.microsoft.com/office/2006/metadata/properties" xmlns:xsi="http://www.w3.org/2001/XMLSchema-instance" xmlns:pc="http://schemas.microsoft.com/office/infopath/2007/PartnerControls">
+  <documentManagement/>
+</p:properties>
 </file>
 
 <file path=customXml/itemProps1.xml><?xml version="1.0" encoding="utf-8"?>
-<ds:datastoreItem xmlns:ds="http://schemas.openxmlformats.org/officeDocument/2006/customXml" ds:itemID="{6A311F3F-FC1F-49F7-86D4-93433AD32505}">
+<ds:datastoreItem xmlns:ds="http://schemas.openxmlformats.org/officeDocument/2006/customXml" ds:itemID="{19E37ADE-E088-4B5A-A682-488D095075CF}">
   <ds:schemaRefs>
-    <ds:schemaRef ds:uri="http://schemas.microsoft.com/office/2006/documentManagement/types"/>
-    <ds:schemaRef ds:uri="http://schemas.microsoft.com/office/2006/metadata/properties"/>
-    <ds:schemaRef ds:uri="http://schemas.openxmlformats.org/package/2006/metadata/core-properties"/>
-    <ds:schemaRef ds:uri="http://purl.org/dc/elements/1.1/"/>
-    <ds:schemaRef ds:uri="http://schemas.microsoft.com/office/infopath/2007/PartnerControls"/>
-    <ds:schemaRef ds:uri="http://purl.org/dc/terms/"/>
-    <ds:schemaRef ds:uri="http://purl.org/dc/dcmitype/"/>
-    <ds:schemaRef ds:uri="http://www.w3.org/XML/1998/namespace"/>
+    <ds:schemaRef ds:uri="http://schemas.microsoft.com/sharepoint/v3/contenttype/forms"/>
   </ds:schemaRefs>
 </ds:datastoreItem>
 </file>
@@ -23972,9 +24185,16 @@
 </file>
 
 <file path=customXml/itemProps3.xml><?xml version="1.0" encoding="utf-8"?>
-<ds:datastoreItem xmlns:ds="http://schemas.openxmlformats.org/officeDocument/2006/customXml" ds:itemID="{19E37ADE-E088-4B5A-A682-488D095075CF}">
+<ds:datastoreItem xmlns:ds="http://schemas.openxmlformats.org/officeDocument/2006/customXml" ds:itemID="{6A311F3F-FC1F-49F7-86D4-93433AD32505}">
   <ds:schemaRefs>
-    <ds:schemaRef ds:uri="http://schemas.microsoft.com/sharepoint/v3/contenttype/forms"/>
+    <ds:schemaRef ds:uri="http://schemas.microsoft.com/office/2006/documentManagement/types"/>
+    <ds:schemaRef ds:uri="http://schemas.microsoft.com/office/2006/metadata/properties"/>
+    <ds:schemaRef ds:uri="http://schemas.openxmlformats.org/package/2006/metadata/core-properties"/>
+    <ds:schemaRef ds:uri="http://purl.org/dc/elements/1.1/"/>
+    <ds:schemaRef ds:uri="http://schemas.microsoft.com/office/infopath/2007/PartnerControls"/>
+    <ds:schemaRef ds:uri="http://purl.org/dc/terms/"/>
+    <ds:schemaRef ds:uri="http://purl.org/dc/dcmitype/"/>
+    <ds:schemaRef ds:uri="http://www.w3.org/XML/1998/namespace"/>
   </ds:schemaRefs>
 </ds:datastoreItem>
 </file>
</xml_diff>

<commit_message>
change the links to quiz
</commit_message>
<xml_diff>
--- a/bootcamp-azure-fundamentels-v2.pptx
+++ b/bootcamp-azure-fundamentels-v2.pptx
@@ -260,7 +260,7 @@
           <a:p>
             <a:fld id="{48782496-95A0-4193-B09F-6AD27878C74F}" type="datetimeFigureOut">
               <a:rPr lang="en-US" smtClean="0"/>
-              <a:t>6/18/2019</a:t>
+              <a:t>10/1/2019</a:t>
             </a:fld>
             <a:endParaRPr lang="en-US"/>
           </a:p>
@@ -437,7 +437,7 @@
           <a:p>
             <a:fld id="{41A012BF-EEA3-45CC-947C-015BB12AB8BD}" type="datetimeFigureOut">
               <a:rPr lang="en-US" smtClean="0"/>
-              <a:t>6/18/2019</a:t>
+              <a:t>10/1/2019</a:t>
             </a:fld>
             <a:endParaRPr lang="en-US"/>
           </a:p>
@@ -910,7 +910,7 @@
           <a:p>
             <a:fld id="{9427A7F7-BB1E-479D-AFAA-B52F4D0C99F2}" type="datetime8">
               <a:rPr lang="en-US" smtClean="0"/>
-              <a:t>6/18/2019 10:12 PM</a:t>
+              <a:t>10/1/2019 9:55 AM</a:t>
             </a:fld>
             <a:endParaRPr lang="en-US" dirty="0"/>
           </a:p>
@@ -954,6 +954,93 @@
 </file>
 
 <file path=ppt/notesSlides/notesSlide3.xml><?xml version="1.0" encoding="utf-8"?>
+<p:notes xmlns:a="http://schemas.openxmlformats.org/drawingml/2006/main" xmlns:r="http://schemas.openxmlformats.org/officeDocument/2006/relationships" xmlns:p="http://schemas.openxmlformats.org/presentationml/2006/main">
+  <p:cSld>
+    <p:spTree>
+      <p:nvGrpSpPr>
+        <p:cNvPr id="1" name=""/>
+        <p:cNvGrpSpPr/>
+        <p:nvPr/>
+      </p:nvGrpSpPr>
+      <p:grpSpPr>
+        <a:xfrm>
+          <a:off x="0" y="0"/>
+          <a:ext cx="0" cy="0"/>
+          <a:chOff x="0" y="0"/>
+          <a:chExt cx="0" cy="0"/>
+        </a:xfrm>
+      </p:grpSpPr>
+      <p:sp>
+        <p:nvSpPr>
+          <p:cNvPr id="2" name="Folienbildplatzhalter 1"/>
+          <p:cNvSpPr>
+            <a:spLocks noGrp="1" noRot="1" noChangeAspect="1"/>
+          </p:cNvSpPr>
+          <p:nvPr>
+            <p:ph type="sldImg"/>
+          </p:nvPr>
+        </p:nvSpPr>
+        <p:spPr/>
+      </p:sp>
+      <p:sp>
+        <p:nvSpPr>
+          <p:cNvPr id="3" name="Notizenplatzhalter 2"/>
+          <p:cNvSpPr>
+            <a:spLocks noGrp="1"/>
+          </p:cNvSpPr>
+          <p:nvPr>
+            <p:ph type="body" idx="1"/>
+          </p:nvPr>
+        </p:nvSpPr>
+        <p:spPr/>
+        <p:txBody>
+          <a:bodyPr/>
+          <a:lstStyle/>
+          <a:p>
+            <a:r>
+              <a:rPr lang="de-DE" dirty="0"/>
+              <a:t>01.10.19 – QR Code Fund. Bootcamp Hamburg 02.10.2019</a:t>
+            </a:r>
+          </a:p>
+        </p:txBody>
+      </p:sp>
+      <p:sp>
+        <p:nvSpPr>
+          <p:cNvPr id="4" name="Foliennummernplatzhalter 3"/>
+          <p:cNvSpPr>
+            <a:spLocks noGrp="1"/>
+          </p:cNvSpPr>
+          <p:nvPr>
+            <p:ph type="sldNum" sz="quarter" idx="5"/>
+          </p:nvPr>
+        </p:nvSpPr>
+        <p:spPr/>
+        <p:txBody>
+          <a:bodyPr/>
+          <a:lstStyle/>
+          <a:p>
+            <a:fld id="{526BFB95-F7E9-4E12-8F4D-EDB340397A7D}" type="slidenum">
+              <a:rPr lang="en-US" smtClean="0"/>
+              <a:t>14</a:t>
+            </a:fld>
+            <a:endParaRPr lang="en-US"/>
+          </a:p>
+        </p:txBody>
+      </p:sp>
+    </p:spTree>
+    <p:extLst>
+      <p:ext uri="{BB962C8B-B14F-4D97-AF65-F5344CB8AC3E}">
+        <p14:creationId xmlns:p14="http://schemas.microsoft.com/office/powerpoint/2010/main" val="417540452"/>
+      </p:ext>
+    </p:extLst>
+  </p:cSld>
+  <p:clrMapOvr>
+    <a:masterClrMapping/>
+  </p:clrMapOvr>
+</p:notes>
+</file>
+
+<file path=ppt/notesSlides/notesSlide4.xml><?xml version="1.0" encoding="utf-8"?>
 <p:notes xmlns:a="http://schemas.openxmlformats.org/drawingml/2006/main" xmlns:r="http://schemas.openxmlformats.org/officeDocument/2006/relationships" xmlns:p="http://schemas.openxmlformats.org/presentationml/2006/main">
   <p:cSld>
     <p:spTree>
@@ -1096,7 +1183,7 @@
               <a:pPr defTabSz="950464">
                 <a:defRPr/>
               </a:pPr>
-              <a:t>6/18/2019 10:12 PM</a:t>
+              <a:t>10/1/2019 9:55 AM</a:t>
             </a:fld>
             <a:endParaRPr lang="en-US">
               <a:solidFill>
@@ -6096,8 +6183,8 @@
         </p:nvSpPr>
         <p:spPr>
           <a:xfrm>
-            <a:off x="274702" y="2800693"/>
-            <a:ext cx="9143936" cy="932563"/>
+            <a:off x="274702" y="2052796"/>
+            <a:ext cx="9143936" cy="1680460"/>
           </a:xfrm>
         </p:spPr>
         <p:txBody>
@@ -6106,7 +6193,14 @@
           <a:p>
             <a:r>
               <a:rPr lang="en-US" b="1" dirty="0"/>
-              <a:t>Azure Fundamentals Bootcamp</a:t>
+              <a:t>Intelligent Cloud Bootcamp</a:t>
+            </a:r>
+            <a:br>
+              <a:rPr lang="en-US" b="1" dirty="0"/>
+            </a:br>
+            <a:r>
+              <a:rPr lang="en-US" b="1" dirty="0"/>
+              <a:t>Azure Fundamentals (20WK15)</a:t>
             </a:r>
             <a:endParaRPr lang="en-US" dirty="0"/>
           </a:p>
@@ -6470,7 +6564,7 @@
                   <a:schemeClr val="bg1"/>
                 </a:solidFill>
               </a:rPr>
-              <a:t>	Eventcode: msevent027mi </a:t>
+              <a:t>	Eventcode: msevent723ir </a:t>
             </a:r>
           </a:p>
         </p:txBody>
@@ -14196,6 +14290,42 @@
           </a:p>
         </p:txBody>
       </p:sp>
+      <p:pic>
+        <p:nvPicPr>
+          <p:cNvPr id="5" name="Grafik 4" descr="Ein Bild, das drinnen, schwarz, Foto, Stück enthält.&#10;&#10;Automatisch generierte Beschreibung">
+            <a:extLst>
+              <a:ext uri="{FF2B5EF4-FFF2-40B4-BE49-F238E27FC236}">
+                <a16:creationId xmlns:a16="http://schemas.microsoft.com/office/drawing/2014/main" id="{35B39F17-A216-4346-B535-C26ED0A8B8C0}"/>
+              </a:ext>
+            </a:extLst>
+          </p:cNvPr>
+          <p:cNvPicPr>
+            <a:picLocks noChangeAspect="1"/>
+          </p:cNvPicPr>
+          <p:nvPr/>
+        </p:nvPicPr>
+        <p:blipFill>
+          <a:blip r:embed="rId3">
+            <a:extLst>
+              <a:ext uri="{28A0092B-C50C-407E-A947-70E740481C1C}">
+                <a14:useLocalDpi xmlns:a14="http://schemas.microsoft.com/office/drawing/2010/main" val="0"/>
+              </a:ext>
+            </a:extLst>
+          </a:blip>
+          <a:stretch>
+            <a:fillRect/>
+          </a:stretch>
+        </p:blipFill>
+        <p:spPr>
+          <a:xfrm>
+            <a:off x="4161080" y="1782884"/>
+            <a:ext cx="4343158" cy="4343158"/>
+          </a:xfrm>
+          <a:prstGeom prst="rect">
+            <a:avLst/>
+          </a:prstGeom>
+        </p:spPr>
+      </p:pic>
     </p:spTree>
     <p:extLst>
       <p:ext uri="{BB962C8B-B14F-4D97-AF65-F5344CB8AC3E}">
@@ -24002,6 +24132,15 @@
 </file>
 
 <file path=customXml/item1.xml><?xml version="1.0" encoding="utf-8"?>
+<?mso-contentType ?>
+<FormTemplates xmlns="http://schemas.microsoft.com/sharepoint/v3/contenttype/forms">
+  <Display>DocumentLibraryForm</Display>
+  <Edit>DocumentLibraryForm</Edit>
+  <New>DocumentLibraryForm</New>
+</FormTemplates>
+</file>
+
+<file path=customXml/item2.xml><?xml version="1.0" encoding="utf-8"?>
 <ct:contentTypeSchema xmlns:ct="http://schemas.microsoft.com/office/2006/metadata/contentType" xmlns:ma="http://schemas.microsoft.com/office/2006/metadata/properties/metaAttributes" ct:_="" ma:_="" ma:contentTypeName="Document" ma:contentTypeID="0x0101004F366B2263FCDC41B3571AF58DF324C9" ma:contentTypeVersion="0" ma:contentTypeDescription="Create a new document." ma:contentTypeScope="" ma:versionID="f3d3620f147d7f01d107c44eceebb519">
   <xsd:schema xmlns:xsd="http://www.w3.org/2001/XMLSchema" xmlns:xs="http://www.w3.org/2001/XMLSchema" xmlns:p="http://schemas.microsoft.com/office/2006/metadata/properties" targetNamespace="http://schemas.microsoft.com/office/2006/metadata/properties" ma:root="true" ma:fieldsID="ba2458a5a1f72a5b1ad9072b9281da93">
     <xsd:element name="properties">
@@ -24115,15 +24254,6 @@
 </ct:contentTypeSchema>
 </file>
 
-<file path=customXml/item2.xml><?xml version="1.0" encoding="utf-8"?>
-<?mso-contentType ?>
-<FormTemplates xmlns="http://schemas.microsoft.com/sharepoint/v3/contenttype/forms">
-  <Display>DocumentLibraryForm</Display>
-  <Edit>DocumentLibraryForm</Edit>
-  <New>DocumentLibraryForm</New>
-</FormTemplates>
-</file>
-
 <file path=customXml/item3.xml><?xml version="1.0" encoding="utf-8"?>
 <p:properties xmlns:p="http://schemas.microsoft.com/office/2006/metadata/properties" xmlns:xsi="http://www.w3.org/2001/XMLSchema-instance" xmlns:pc="http://schemas.microsoft.com/office/infopath/2007/PartnerControls">
   <documentManagement/>
@@ -24131,6 +24261,14 @@
 </file>
 
 <file path=customXml/itemProps1.xml><?xml version="1.0" encoding="utf-8"?>
+<ds:datastoreItem xmlns:ds="http://schemas.openxmlformats.org/officeDocument/2006/customXml" ds:itemID="{19E37ADE-E088-4B5A-A682-488D095075CF}">
+  <ds:schemaRefs>
+    <ds:schemaRef ds:uri="http://schemas.microsoft.com/sharepoint/v3/contenttype/forms"/>
+  </ds:schemaRefs>
+</ds:datastoreItem>
+</file>
+
+<file path=customXml/itemProps2.xml><?xml version="1.0" encoding="utf-8"?>
 <ds:datastoreItem xmlns:ds="http://schemas.openxmlformats.org/officeDocument/2006/customXml" ds:itemID="{05CDDA49-6D84-41B9-8FEC-258C48043127}">
   <ds:schemaRefs>
     <ds:schemaRef ds:uri="http://schemas.microsoft.com/office/2006/metadata/contentType"/>
@@ -24142,14 +24280,6 @@
     <ds:schemaRef ds:uri="http://purl.org/dc/terms/"/>
     <ds:schemaRef ds:uri="http://schemas.microsoft.com/internal/obd"/>
     <ds:schemaRef ds:uri="http://schemas.microsoft.com/office/infopath/2007/PartnerControls"/>
-  </ds:schemaRefs>
-</ds:datastoreItem>
-</file>
-
-<file path=customXml/itemProps2.xml><?xml version="1.0" encoding="utf-8"?>
-<ds:datastoreItem xmlns:ds="http://schemas.openxmlformats.org/officeDocument/2006/customXml" ds:itemID="{19E37ADE-E088-4B5A-A682-488D095075CF}">
-  <ds:schemaRefs>
-    <ds:schemaRef ds:uri="http://schemas.microsoft.com/sharepoint/v3/contenttype/forms"/>
   </ds:schemaRefs>
 </ds:datastoreItem>
 </file>

</xml_diff>